<commit_message>
update notebooks and slides
</commit_message>
<xml_diff>
--- a/slides/Outline.pptx
+++ b/slides/Outline.pptx
@@ -5,11 +5,13 @@
     <p:sldMasterId id="2147483648" r:id="rId1"/>
   </p:sldMasterIdLst>
   <p:notesMasterIdLst>
-    <p:notesMasterId r:id="rId4"/>
+    <p:notesMasterId r:id="rId6"/>
   </p:notesMasterIdLst>
   <p:sldIdLst>
     <p:sldId id="364" r:id="rId2"/>
     <p:sldId id="365" r:id="rId3"/>
+    <p:sldId id="366" r:id="rId4"/>
+    <p:sldId id="367" r:id="rId5"/>
   </p:sldIdLst>
   <p:sldSz cx="12192000" cy="6858000"/>
   <p:notesSz cx="6858000" cy="9144000"/>
@@ -712,6 +714,298 @@
     <p:extLst>
       <p:ext uri="{BB962C8B-B14F-4D97-AF65-F5344CB8AC3E}">
         <p14:creationId xmlns:p14="http://schemas.microsoft.com/office/powerpoint/2010/main" val="1330269129"/>
+      </p:ext>
+    </p:extLst>
+  </p:cSld>
+  <p:clrMapOvr>
+    <a:masterClrMapping/>
+  </p:clrMapOvr>
+</p:notes>
+</file>
+
+<file path=ppt/notesSlides/notesSlide3.xml><?xml version="1.0" encoding="utf-8"?>
+<p:notes xmlns:a="http://schemas.openxmlformats.org/drawingml/2006/main" xmlns:r="http://schemas.openxmlformats.org/officeDocument/2006/relationships" xmlns:p="http://schemas.openxmlformats.org/presentationml/2006/main">
+  <p:cSld>
+    <p:spTree>
+      <p:nvGrpSpPr>
+        <p:cNvPr id="1" name=""/>
+        <p:cNvGrpSpPr/>
+        <p:nvPr/>
+      </p:nvGrpSpPr>
+      <p:grpSpPr>
+        <a:xfrm>
+          <a:off x="0" y="0"/>
+          <a:ext cx="0" cy="0"/>
+          <a:chOff x="0" y="0"/>
+          <a:chExt cx="0" cy="0"/>
+        </a:xfrm>
+      </p:grpSpPr>
+      <p:sp>
+        <p:nvSpPr>
+          <p:cNvPr id="2" name="Slide Image Placeholder 1"/>
+          <p:cNvSpPr>
+            <a:spLocks noGrp="1" noRot="1" noChangeAspect="1"/>
+          </p:cNvSpPr>
+          <p:nvPr>
+            <p:ph type="sldImg"/>
+          </p:nvPr>
+        </p:nvSpPr>
+        <p:spPr/>
+      </p:sp>
+      <p:sp>
+        <p:nvSpPr>
+          <p:cNvPr id="3" name="Notes Placeholder 2"/>
+          <p:cNvSpPr>
+            <a:spLocks noGrp="1"/>
+          </p:cNvSpPr>
+          <p:nvPr>
+            <p:ph type="body" idx="1"/>
+          </p:nvPr>
+        </p:nvSpPr>
+        <p:spPr/>
+        <p:txBody>
+          <a:bodyPr/>
+          <a:lstStyle/>
+          <a:p>
+            <a:pPr marL="171450" indent="-171450">
+              <a:buFont typeface="Arial" panose="020B0604020202020204" pitchFamily="34" charset="0"/>
+              <a:buChar char="•"/>
+            </a:pPr>
+            <a:r>
+              <a:rPr lang="en-US" sz="1000" b="0" i="0" kern="1200" dirty="0">
+                <a:solidFill>
+                  <a:schemeClr val="tx1"/>
+                </a:solidFill>
+                <a:effectLst/>
+                <a:latin typeface="Amazon Ember Regular" charset="0"/>
+                <a:ea typeface="+mn-ea"/>
+                <a:cs typeface="+mn-cs"/>
+              </a:rPr>
+              <a:t>Please send an email to this email account and shortly we will reply two emails, one for confirmation, and the second email will include a unique </a:t>
+            </a:r>
+            <a:r>
+              <a:rPr lang="en-US" sz="1000" b="0" i="0" kern="1200" dirty="0" err="1">
+                <a:solidFill>
+                  <a:schemeClr val="tx1"/>
+                </a:solidFill>
+                <a:effectLst/>
+                <a:latin typeface="Amazon Ember Regular" charset="0"/>
+                <a:ea typeface="+mn-ea"/>
+                <a:cs typeface="+mn-cs"/>
+              </a:rPr>
+              <a:t>url</a:t>
+            </a:r>
+            <a:r>
+              <a:rPr lang="en-US" sz="1000" b="0" i="0" kern="1200" dirty="0">
+                <a:solidFill>
+                  <a:schemeClr val="tx1"/>
+                </a:solidFill>
+                <a:effectLst/>
+                <a:latin typeface="Amazon Ember Regular" charset="0"/>
+                <a:ea typeface="+mn-ea"/>
+                <a:cs typeface="+mn-cs"/>
+              </a:rPr>
+              <a:t> for you to try the runnable examples. I strongly recommend you to try it now, since it will take a while to download some large datasets we will use for today.</a:t>
+            </a:r>
+          </a:p>
+        </p:txBody>
+      </p:sp>
+      <p:sp>
+        <p:nvSpPr>
+          <p:cNvPr id="4" name="Slide Number Placeholder 3"/>
+          <p:cNvSpPr>
+            <a:spLocks noGrp="1"/>
+          </p:cNvSpPr>
+          <p:nvPr>
+            <p:ph type="sldNum" sz="quarter" idx="10"/>
+          </p:nvPr>
+        </p:nvSpPr>
+        <p:spPr/>
+        <p:txBody>
+          <a:bodyPr/>
+          <a:lstStyle/>
+          <a:p>
+            <a:fld id="{69C3F2ED-74C5-7D4F-8560-0CC253E9A436}" type="slidenum">
+              <a:rPr lang="en-US" smtClean="0"/>
+              <a:pPr/>
+              <a:t>3</a:t>
+            </a:fld>
+            <a:endParaRPr lang="en-US" dirty="0"/>
+          </a:p>
+        </p:txBody>
+      </p:sp>
+      <p:sp>
+        <p:nvSpPr>
+          <p:cNvPr id="5" name="Footer Placeholder 4"/>
+          <p:cNvSpPr>
+            <a:spLocks noGrp="1"/>
+          </p:cNvSpPr>
+          <p:nvPr>
+            <p:ph type="ftr" sz="quarter" idx="11"/>
+          </p:nvPr>
+        </p:nvSpPr>
+        <p:spPr/>
+        <p:txBody>
+          <a:bodyPr/>
+          <a:lstStyle/>
+          <a:p>
+            <a:r>
+              <a:rPr lang="en-US" dirty="0"/>
+              <a:t>Amazon Confidential</a:t>
+            </a:r>
+          </a:p>
+        </p:txBody>
+      </p:sp>
+    </p:spTree>
+    <p:extLst>
+      <p:ext uri="{BB962C8B-B14F-4D97-AF65-F5344CB8AC3E}">
+        <p14:creationId xmlns:p14="http://schemas.microsoft.com/office/powerpoint/2010/main" val="615164457"/>
+      </p:ext>
+    </p:extLst>
+  </p:cSld>
+  <p:clrMapOvr>
+    <a:masterClrMapping/>
+  </p:clrMapOvr>
+</p:notes>
+</file>
+
+<file path=ppt/notesSlides/notesSlide4.xml><?xml version="1.0" encoding="utf-8"?>
+<p:notes xmlns:a="http://schemas.openxmlformats.org/drawingml/2006/main" xmlns:r="http://schemas.openxmlformats.org/officeDocument/2006/relationships" xmlns:p="http://schemas.openxmlformats.org/presentationml/2006/main">
+  <p:cSld>
+    <p:spTree>
+      <p:nvGrpSpPr>
+        <p:cNvPr id="1" name=""/>
+        <p:cNvGrpSpPr/>
+        <p:nvPr/>
+      </p:nvGrpSpPr>
+      <p:grpSpPr>
+        <a:xfrm>
+          <a:off x="0" y="0"/>
+          <a:ext cx="0" cy="0"/>
+          <a:chOff x="0" y="0"/>
+          <a:chExt cx="0" cy="0"/>
+        </a:xfrm>
+      </p:grpSpPr>
+      <p:sp>
+        <p:nvSpPr>
+          <p:cNvPr id="2" name="Slide Image Placeholder 1"/>
+          <p:cNvSpPr>
+            <a:spLocks noGrp="1" noRot="1" noChangeAspect="1"/>
+          </p:cNvSpPr>
+          <p:nvPr>
+            <p:ph type="sldImg"/>
+          </p:nvPr>
+        </p:nvSpPr>
+        <p:spPr/>
+      </p:sp>
+      <p:sp>
+        <p:nvSpPr>
+          <p:cNvPr id="3" name="Notes Placeholder 2"/>
+          <p:cNvSpPr>
+            <a:spLocks noGrp="1"/>
+          </p:cNvSpPr>
+          <p:nvPr>
+            <p:ph type="body" idx="1"/>
+          </p:nvPr>
+        </p:nvSpPr>
+        <p:spPr/>
+        <p:txBody>
+          <a:bodyPr/>
+          <a:lstStyle/>
+          <a:p>
+            <a:pPr marL="171450" indent="-171450">
+              <a:buFont typeface="Arial" panose="020B0604020202020204" pitchFamily="34" charset="0"/>
+              <a:buChar char="•"/>
+            </a:pPr>
+            <a:r>
+              <a:rPr lang="en-US" sz="1000" b="0" i="0" kern="1200" dirty="0">
+                <a:solidFill>
+                  <a:schemeClr val="tx1"/>
+                </a:solidFill>
+                <a:effectLst/>
+                <a:latin typeface="Amazon Ember Regular" charset="0"/>
+                <a:ea typeface="+mn-ea"/>
+                <a:cs typeface="+mn-cs"/>
+              </a:rPr>
+              <a:t>Please send an email to this email account and shortly we will reply two emails, one for confirmation, and the second email will include a unique </a:t>
+            </a:r>
+            <a:r>
+              <a:rPr lang="en-US" sz="1000" b="0" i="0" kern="1200" dirty="0" err="1">
+                <a:solidFill>
+                  <a:schemeClr val="tx1"/>
+                </a:solidFill>
+                <a:effectLst/>
+                <a:latin typeface="Amazon Ember Regular" charset="0"/>
+                <a:ea typeface="+mn-ea"/>
+                <a:cs typeface="+mn-cs"/>
+              </a:rPr>
+              <a:t>url</a:t>
+            </a:r>
+            <a:r>
+              <a:rPr lang="en-US" sz="1000" b="0" i="0" kern="1200" dirty="0">
+                <a:solidFill>
+                  <a:schemeClr val="tx1"/>
+                </a:solidFill>
+                <a:effectLst/>
+                <a:latin typeface="Amazon Ember Regular" charset="0"/>
+                <a:ea typeface="+mn-ea"/>
+                <a:cs typeface="+mn-cs"/>
+              </a:rPr>
+              <a:t> for you to try the runnable examples. I strongly recommend you to try it now, since it will take a while to download some large datasets we will use for today.</a:t>
+            </a:r>
+          </a:p>
+        </p:txBody>
+      </p:sp>
+      <p:sp>
+        <p:nvSpPr>
+          <p:cNvPr id="4" name="Slide Number Placeholder 3"/>
+          <p:cNvSpPr>
+            <a:spLocks noGrp="1"/>
+          </p:cNvSpPr>
+          <p:nvPr>
+            <p:ph type="sldNum" sz="quarter" idx="10"/>
+          </p:nvPr>
+        </p:nvSpPr>
+        <p:spPr/>
+        <p:txBody>
+          <a:bodyPr/>
+          <a:lstStyle/>
+          <a:p>
+            <a:fld id="{69C3F2ED-74C5-7D4F-8560-0CC253E9A436}" type="slidenum">
+              <a:rPr lang="en-US" smtClean="0"/>
+              <a:pPr/>
+              <a:t>4</a:t>
+            </a:fld>
+            <a:endParaRPr lang="en-US" dirty="0"/>
+          </a:p>
+        </p:txBody>
+      </p:sp>
+      <p:sp>
+        <p:nvSpPr>
+          <p:cNvPr id="5" name="Footer Placeholder 4"/>
+          <p:cNvSpPr>
+            <a:spLocks noGrp="1"/>
+          </p:cNvSpPr>
+          <p:nvPr>
+            <p:ph type="ftr" sz="quarter" idx="11"/>
+          </p:nvPr>
+        </p:nvSpPr>
+        <p:spPr/>
+        <p:txBody>
+          <a:bodyPr/>
+          <a:lstStyle/>
+          <a:p>
+            <a:r>
+              <a:rPr lang="en-US" dirty="0"/>
+              <a:t>Amazon Confidential</a:t>
+            </a:r>
+          </a:p>
+        </p:txBody>
+      </p:sp>
+    </p:spTree>
+    <p:extLst>
+      <p:ext uri="{BB962C8B-B14F-4D97-AF65-F5344CB8AC3E}">
+        <p14:creationId xmlns:p14="http://schemas.microsoft.com/office/powerpoint/2010/main" val="2730327279"/>
       </p:ext>
     </p:extLst>
   </p:cSld>
@@ -6060,6 +6354,297 @@
 </p:sld>
 </file>
 
+<file path=ppt/slides/slide3.xml><?xml version="1.0" encoding="utf-8"?>
+<p:sld xmlns:a="http://schemas.openxmlformats.org/drawingml/2006/main" xmlns:r="http://schemas.openxmlformats.org/officeDocument/2006/relationships" xmlns:p="http://schemas.openxmlformats.org/presentationml/2006/main">
+  <p:cSld>
+    <p:spTree>
+      <p:nvGrpSpPr>
+        <p:cNvPr id="1" name=""/>
+        <p:cNvGrpSpPr/>
+        <p:nvPr/>
+      </p:nvGrpSpPr>
+      <p:grpSpPr>
+        <a:xfrm>
+          <a:off x="0" y="0"/>
+          <a:ext cx="0" cy="0"/>
+          <a:chOff x="0" y="0"/>
+          <a:chExt cx="0" cy="0"/>
+        </a:xfrm>
+      </p:grpSpPr>
+      <p:sp>
+        <p:nvSpPr>
+          <p:cNvPr id="13" name="Title 4">
+            <a:extLst>
+              <a:ext uri="{FF2B5EF4-FFF2-40B4-BE49-F238E27FC236}">
+                <a16:creationId xmlns:a16="http://schemas.microsoft.com/office/drawing/2014/main" id="{2DA53383-82DC-40F4-A734-4D0158B470D7}"/>
+              </a:ext>
+            </a:extLst>
+          </p:cNvPr>
+          <p:cNvSpPr>
+            <a:spLocks noGrp="1"/>
+          </p:cNvSpPr>
+          <p:nvPr>
+            <p:ph type="title" idx="4294967295"/>
+          </p:nvPr>
+        </p:nvSpPr>
+        <p:spPr>
+          <a:xfrm>
+            <a:off x="162766" y="147865"/>
+            <a:ext cx="10363200" cy="1026036"/>
+          </a:xfrm>
+        </p:spPr>
+        <p:txBody>
+          <a:bodyPr/>
+          <a:lstStyle/>
+          <a:p>
+            <a:r>
+              <a:rPr lang="en-US" sz="4000" dirty="0">
+                <a:solidFill>
+                  <a:schemeClr val="bg1"/>
+                </a:solidFill>
+                <a:latin typeface="Amazon Ember" panose="02000000000000000000" pitchFamily="2" charset="0"/>
+                <a:ea typeface="Amazon Ember" panose="02000000000000000000" pitchFamily="2" charset="0"/>
+                <a:cs typeface="Amazon Ember Cd" panose="020B0606020204020204" pitchFamily="34" charset="0"/>
+              </a:rPr>
+              <a:t>Free AWS </a:t>
+            </a:r>
+            <a:r>
+              <a:rPr lang="en-US" sz="4000" dirty="0" err="1">
+                <a:solidFill>
+                  <a:schemeClr val="bg1"/>
+                </a:solidFill>
+                <a:latin typeface="Amazon Ember" panose="02000000000000000000" pitchFamily="2" charset="0"/>
+                <a:ea typeface="Amazon Ember" panose="02000000000000000000" pitchFamily="2" charset="0"/>
+                <a:cs typeface="Amazon Ember Cd" panose="020B0606020204020204" pitchFamily="34" charset="0"/>
+              </a:rPr>
+              <a:t>SageMaker</a:t>
+            </a:r>
+            <a:r>
+              <a:rPr lang="en-US" sz="4000" dirty="0">
+                <a:solidFill>
+                  <a:schemeClr val="bg1"/>
+                </a:solidFill>
+                <a:latin typeface="Amazon Ember" panose="02000000000000000000" pitchFamily="2" charset="0"/>
+                <a:ea typeface="Amazon Ember" panose="02000000000000000000" pitchFamily="2" charset="0"/>
+                <a:cs typeface="Amazon Ember Cd" panose="020B0606020204020204" pitchFamily="34" charset="0"/>
+              </a:rPr>
+              <a:t> instance</a:t>
+            </a:r>
+          </a:p>
+        </p:txBody>
+      </p:sp>
+      <p:pic>
+        <p:nvPicPr>
+          <p:cNvPr id="2" name="Picture 1">
+            <a:extLst>
+              <a:ext uri="{FF2B5EF4-FFF2-40B4-BE49-F238E27FC236}">
+                <a16:creationId xmlns:a16="http://schemas.microsoft.com/office/drawing/2014/main" id="{FCE581EF-8A27-4828-B2A0-94ED32196F8F}"/>
+              </a:ext>
+            </a:extLst>
+          </p:cNvPr>
+          <p:cNvPicPr>
+            <a:picLocks noChangeAspect="1"/>
+          </p:cNvPicPr>
+          <p:nvPr/>
+        </p:nvPicPr>
+        <p:blipFill>
+          <a:blip r:embed="rId3">
+            <a:lum bright="70000" contrast="-70000"/>
+            <a:alphaModFix amt="20000"/>
+          </a:blip>
+          <a:stretch>
+            <a:fillRect/>
+          </a:stretch>
+        </p:blipFill>
+        <p:spPr>
+          <a:xfrm>
+            <a:off x="6951435" y="3066585"/>
+            <a:ext cx="4700915" cy="3130532"/>
+          </a:xfrm>
+          <a:prstGeom prst="rect">
+            <a:avLst/>
+          </a:prstGeom>
+        </p:spPr>
+      </p:pic>
+      <p:sp>
+        <p:nvSpPr>
+          <p:cNvPr id="3" name="TextBox 2">
+            <a:extLst>
+              <a:ext uri="{FF2B5EF4-FFF2-40B4-BE49-F238E27FC236}">
+                <a16:creationId xmlns:a16="http://schemas.microsoft.com/office/drawing/2014/main" id="{82341935-8494-2E4C-871E-CF3766A0A5C0}"/>
+              </a:ext>
+            </a:extLst>
+          </p:cNvPr>
+          <p:cNvSpPr txBox="1"/>
+          <p:nvPr/>
+        </p:nvSpPr>
+        <p:spPr>
+          <a:xfrm>
+            <a:off x="1812487" y="3429000"/>
+            <a:ext cx="8567025" cy="523220"/>
+          </a:xfrm>
+          <a:prstGeom prst="rect">
+            <a:avLst/>
+          </a:prstGeom>
+          <a:noFill/>
+        </p:spPr>
+        <p:txBody>
+          <a:bodyPr wrap="none" rtlCol="0">
+            <a:spAutoFit/>
+          </a:bodyPr>
+          <a:lstStyle/>
+          <a:p>
+            <a:r>
+              <a:rPr lang="en-US" sz="2800" u="sng" dirty="0">
+                <a:solidFill>
+                  <a:schemeClr val="bg1"/>
+                </a:solidFill>
+              </a:rPr>
+              <a:t>Send an email to:     iccv19-gluoncv@request-nb.mxnet.io</a:t>
+            </a:r>
+          </a:p>
+        </p:txBody>
+      </p:sp>
+    </p:spTree>
+    <p:extLst>
+      <p:ext uri="{BB962C8B-B14F-4D97-AF65-F5344CB8AC3E}">
+        <p14:creationId xmlns:p14="http://schemas.microsoft.com/office/powerpoint/2010/main" val="2571903239"/>
+      </p:ext>
+    </p:extLst>
+  </p:cSld>
+  <p:clrMapOvr>
+    <a:masterClrMapping/>
+  </p:clrMapOvr>
+  <mc:AlternateContent xmlns:mc="http://schemas.openxmlformats.org/markup-compatibility/2006" xmlns:p14="http://schemas.microsoft.com/office/powerpoint/2010/main">
+    <mc:Choice Requires="p14">
+      <p:transition spd="med" p14:dur="700">
+        <p:fade/>
+      </p:transition>
+    </mc:Choice>
+    <mc:Fallback xmlns="">
+      <p:transition spd="med">
+        <p:fade/>
+      </p:transition>
+    </mc:Fallback>
+  </mc:AlternateContent>
+</p:sld>
+</file>
+
+<file path=ppt/slides/slide4.xml><?xml version="1.0" encoding="utf-8"?>
+<p:sld xmlns:a="http://schemas.openxmlformats.org/drawingml/2006/main" xmlns:r="http://schemas.openxmlformats.org/officeDocument/2006/relationships" xmlns:p="http://schemas.openxmlformats.org/presentationml/2006/main">
+  <p:cSld>
+    <p:spTree>
+      <p:nvGrpSpPr>
+        <p:cNvPr id="1" name=""/>
+        <p:cNvGrpSpPr/>
+        <p:nvPr/>
+      </p:nvGrpSpPr>
+      <p:grpSpPr>
+        <a:xfrm>
+          <a:off x="0" y="0"/>
+          <a:ext cx="0" cy="0"/>
+          <a:chOff x="0" y="0"/>
+          <a:chExt cx="0" cy="0"/>
+        </a:xfrm>
+      </p:grpSpPr>
+      <p:sp>
+        <p:nvSpPr>
+          <p:cNvPr id="13" name="Title 4">
+            <a:extLst>
+              <a:ext uri="{FF2B5EF4-FFF2-40B4-BE49-F238E27FC236}">
+                <a16:creationId xmlns:a16="http://schemas.microsoft.com/office/drawing/2014/main" id="{2DA53383-82DC-40F4-A734-4D0158B470D7}"/>
+              </a:ext>
+            </a:extLst>
+          </p:cNvPr>
+          <p:cNvSpPr>
+            <a:spLocks noGrp="1"/>
+          </p:cNvSpPr>
+          <p:nvPr>
+            <p:ph type="title" idx="4294967295"/>
+          </p:nvPr>
+        </p:nvSpPr>
+        <p:spPr>
+          <a:xfrm>
+            <a:off x="162766" y="147865"/>
+            <a:ext cx="10363200" cy="1026036"/>
+          </a:xfrm>
+        </p:spPr>
+        <p:txBody>
+          <a:bodyPr/>
+          <a:lstStyle/>
+          <a:p>
+            <a:r>
+              <a:rPr lang="en-US" sz="4000" dirty="0">
+                <a:solidFill>
+                  <a:schemeClr val="bg1"/>
+                </a:solidFill>
+                <a:latin typeface="Amazon Ember" panose="02000000000000000000" pitchFamily="2" charset="0"/>
+                <a:ea typeface="Amazon Ember" panose="02000000000000000000" pitchFamily="2" charset="0"/>
+                <a:cs typeface="Amazon Ember Cd" panose="020B0606020204020204" pitchFamily="34" charset="0"/>
+              </a:rPr>
+              <a:t>The cool stuffs you will get</a:t>
+            </a:r>
+          </a:p>
+        </p:txBody>
+      </p:sp>
+      <p:pic>
+        <p:nvPicPr>
+          <p:cNvPr id="2" name="Picture 1">
+            <a:extLst>
+              <a:ext uri="{FF2B5EF4-FFF2-40B4-BE49-F238E27FC236}">
+                <a16:creationId xmlns:a16="http://schemas.microsoft.com/office/drawing/2014/main" id="{FCE581EF-8A27-4828-B2A0-94ED32196F8F}"/>
+              </a:ext>
+            </a:extLst>
+          </p:cNvPr>
+          <p:cNvPicPr>
+            <a:picLocks noChangeAspect="1"/>
+          </p:cNvPicPr>
+          <p:nvPr/>
+        </p:nvPicPr>
+        <p:blipFill>
+          <a:blip r:embed="rId3">
+            <a:lum bright="70000" contrast="-70000"/>
+            <a:alphaModFix amt="20000"/>
+          </a:blip>
+          <a:stretch>
+            <a:fillRect/>
+          </a:stretch>
+        </p:blipFill>
+        <p:spPr>
+          <a:xfrm>
+            <a:off x="6951435" y="3066585"/>
+            <a:ext cx="4700915" cy="3130532"/>
+          </a:xfrm>
+          <a:prstGeom prst="rect">
+            <a:avLst/>
+          </a:prstGeom>
+        </p:spPr>
+      </p:pic>
+    </p:spTree>
+    <p:extLst>
+      <p:ext uri="{BB962C8B-B14F-4D97-AF65-F5344CB8AC3E}">
+        <p14:creationId xmlns:p14="http://schemas.microsoft.com/office/powerpoint/2010/main" val="1305526818"/>
+      </p:ext>
+    </p:extLst>
+  </p:cSld>
+  <p:clrMapOvr>
+    <a:masterClrMapping/>
+  </p:clrMapOvr>
+  <mc:AlternateContent xmlns:mc="http://schemas.openxmlformats.org/markup-compatibility/2006" xmlns:p14="http://schemas.microsoft.com/office/powerpoint/2010/main">
+    <mc:Choice Requires="p14">
+      <p:transition spd="med" p14:dur="700">
+        <p:fade/>
+      </p:transition>
+    </mc:Choice>
+    <mc:Fallback xmlns="">
+      <p:transition spd="med">
+        <p:fade/>
+      </p:transition>
+    </mc:Fallback>
+  </mc:AlternateContent>
+</p:sld>
+</file>
+
 <file path=ppt/theme/theme1.xml><?xml version="1.0" encoding="utf-8"?>
 <a:theme xmlns:a="http://schemas.openxmlformats.org/drawingml/2006/main" name="Office Theme">
   <a:themeElements>

</xml_diff>